<commit_message>
b4 work push - prstnt - 5yrplot
</commit_message>
<xml_diff>
--- a/SA/Presentation/project_1_schools_presentation (SA).pptx
+++ b/SA/Presentation/project_1_schools_presentation (SA).pptx
@@ -140,10 +140,25 @@
   <pc:docChgLst>
     <pc:chgData name="Sam Azhari" userId="4e04bdb60752e412" providerId="LiveId" clId="{5365E36F-D325-4331-ADF6-8F25ACA6C905}"/>
     <pc:docChg chg="undo custSel addSld delSld modSld">
-      <pc:chgData name="Sam Azhari" userId="4e04bdb60752e412" providerId="LiveId" clId="{5365E36F-D325-4331-ADF6-8F25ACA6C905}" dt="2021-02-11T04:42:35.415" v="300" actId="47"/>
+      <pc:chgData name="Sam Azhari" userId="4e04bdb60752e412" providerId="LiveId" clId="{5365E36F-D325-4331-ADF6-8F25ACA6C905}" dt="2021-02-11T10:29:45.482" v="558" actId="20577"/>
       <pc:docMkLst>
         <pc:docMk/>
       </pc:docMkLst>
+      <pc:sldChg chg="modSp mod">
+        <pc:chgData name="Sam Azhari" userId="4e04bdb60752e412" providerId="LiveId" clId="{5365E36F-D325-4331-ADF6-8F25ACA6C905}" dt="2021-02-11T10:28:59.048" v="523" actId="6549"/>
+        <pc:sldMkLst>
+          <pc:docMk/>
+          <pc:sldMk cId="3852521713" sldId="285"/>
+        </pc:sldMkLst>
+        <pc:spChg chg="mod">
+          <ac:chgData name="Sam Azhari" userId="4e04bdb60752e412" providerId="LiveId" clId="{5365E36F-D325-4331-ADF6-8F25ACA6C905}" dt="2021-02-11T10:28:59.048" v="523" actId="6549"/>
+          <ac:spMkLst>
+            <pc:docMk/>
+            <pc:sldMk cId="3852521713" sldId="285"/>
+            <ac:spMk id="12" creationId="{8BB1D2D3-565B-8645-85F7-41F999D96B52}"/>
+          </ac:spMkLst>
+        </pc:spChg>
+      </pc:sldChg>
       <pc:sldChg chg="del">
         <pc:chgData name="Sam Azhari" userId="4e04bdb60752e412" providerId="LiveId" clId="{5365E36F-D325-4331-ADF6-8F25ACA6C905}" dt="2021-02-11T04:15:21.290" v="2" actId="47"/>
         <pc:sldMkLst>
@@ -194,7 +209,7 @@
         </pc:sldMkLst>
       </pc:sldChg>
       <pc:sldChg chg="addSp delSp modSp add mod">
-        <pc:chgData name="Sam Azhari" userId="4e04bdb60752e412" providerId="LiveId" clId="{5365E36F-D325-4331-ADF6-8F25ACA6C905}" dt="2021-02-11T04:42:22.361" v="298" actId="1076"/>
+        <pc:chgData name="Sam Azhari" userId="4e04bdb60752e412" providerId="LiveId" clId="{5365E36F-D325-4331-ADF6-8F25ACA6C905}" dt="2021-02-11T10:29:26.781" v="553" actId="20577"/>
         <pc:sldMkLst>
           <pc:docMk/>
           <pc:sldMk cId="2754496601" sldId="352"/>
@@ -208,7 +223,7 @@
           </ac:spMkLst>
         </pc:spChg>
         <pc:spChg chg="mod">
-          <ac:chgData name="Sam Azhari" userId="4e04bdb60752e412" providerId="LiveId" clId="{5365E36F-D325-4331-ADF6-8F25ACA6C905}" dt="2021-02-11T04:38:50.218" v="49" actId="20577"/>
+          <ac:chgData name="Sam Azhari" userId="4e04bdb60752e412" providerId="LiveId" clId="{5365E36F-D325-4331-ADF6-8F25ACA6C905}" dt="2021-02-11T10:29:26.781" v="553" actId="20577"/>
           <ac:spMkLst>
             <pc:docMk/>
             <pc:sldMk cId="2754496601" sldId="352"/>
@@ -249,11 +264,19 @@
         </pc:picChg>
       </pc:sldChg>
       <pc:sldChg chg="addSp delSp modSp add mod">
-        <pc:chgData name="Sam Azhari" userId="4e04bdb60752e412" providerId="LiveId" clId="{5365E36F-D325-4331-ADF6-8F25ACA6C905}" dt="2021-02-11T04:42:17.592" v="297" actId="1076"/>
+        <pc:chgData name="Sam Azhari" userId="4e04bdb60752e412" providerId="LiveId" clId="{5365E36F-D325-4331-ADF6-8F25ACA6C905}" dt="2021-02-11T10:29:45.482" v="558" actId="20577"/>
         <pc:sldMkLst>
           <pc:docMk/>
           <pc:sldMk cId="2915661404" sldId="353"/>
         </pc:sldMkLst>
+        <pc:spChg chg="mod">
+          <ac:chgData name="Sam Azhari" userId="4e04bdb60752e412" providerId="LiveId" clId="{5365E36F-D325-4331-ADF6-8F25ACA6C905}" dt="2021-02-11T10:29:45.482" v="558" actId="20577"/>
+          <ac:spMkLst>
+            <pc:docMk/>
+            <pc:sldMk cId="2915661404" sldId="353"/>
+            <ac:spMk id="4" creationId="{80C04FA2-C6F3-4098-B9F9-B6EDB57A0455}"/>
+          </ac:spMkLst>
+        </pc:spChg>
         <pc:spChg chg="add del mod">
           <ac:chgData name="Sam Azhari" userId="4e04bdb60752e412" providerId="LiveId" clId="{5365E36F-D325-4331-ADF6-8F25ACA6C905}" dt="2021-02-11T04:41:58.275" v="293" actId="931"/>
           <ac:spMkLst>
@@ -3855,7 +3878,7 @@
           <a:p>
             <a:fld id="{BB37BDEB-D08A-4BCC-82C3-65677B6346BB}" type="datetimeFigureOut">
               <a:rPr lang="en-US" smtClean="0"/>
-              <a:t>2/10/2021</a:t>
+              <a:t>2/11/2021</a:t>
             </a:fld>
             <a:endParaRPr lang="en-US"/>
           </a:p>
@@ -4032,7 +4055,7 @@
           <a:p>
             <a:fld id="{D64182BB-4E27-4552-8EE4-33C8EF731305}" type="datetimeFigureOut">
               <a:rPr lang="en-US" smtClean="0"/>
-              <a:t>2/10/2021</a:t>
+              <a:t>2/11/2021</a:t>
             </a:fld>
             <a:endParaRPr lang="en-US"/>
           </a:p>
@@ -4537,7 +4560,7 @@
           <a:p>
             <a:fld id="{ED291B17-9318-49DB-B28B-6E5994AE9581}" type="datetime1">
               <a:rPr lang="en-US" smtClean="0"/>
-              <a:t>2/10/2021</a:t>
+              <a:t>2/11/2021</a:t>
             </a:fld>
             <a:endParaRPr lang="en-US" dirty="0"/>
           </a:p>
@@ -4696,7 +4719,7 @@
           <a:p>
             <a:fld id="{4EDE50D6-574B-40AF-946F-D52A04ADE379}" type="datetime1">
               <a:rPr lang="en-US" smtClean="0"/>
-              <a:t>2/10/2021</a:t>
+              <a:t>2/11/2021</a:t>
             </a:fld>
             <a:endParaRPr lang="en-US" dirty="0"/>
           </a:p>
@@ -5108,7 +5131,7 @@
           <a:p>
             <a:fld id="{4EDE50D6-574B-40AF-946F-D52A04ADE379}" type="datetime1">
               <a:rPr lang="en-US" smtClean="0"/>
-              <a:t>2/10/2021</a:t>
+              <a:t>2/11/2021</a:t>
             </a:fld>
             <a:endParaRPr lang="en-US" dirty="0"/>
           </a:p>
@@ -5584,7 +5607,7 @@
           <a:p>
             <a:fld id="{4EDE50D6-574B-40AF-946F-D52A04ADE379}" type="datetime1">
               <a:rPr lang="en-US" smtClean="0"/>
-              <a:t>2/10/2021</a:t>
+              <a:t>2/11/2021</a:t>
             </a:fld>
             <a:endParaRPr lang="en-US" dirty="0"/>
           </a:p>
@@ -6033,7 +6056,7 @@
           <a:p>
             <a:fld id="{4EDE50D6-574B-40AF-946F-D52A04ADE379}" type="datetime1">
               <a:rPr lang="en-US" smtClean="0"/>
-              <a:t>2/10/2021</a:t>
+              <a:t>2/11/2021</a:t>
             </a:fld>
             <a:endParaRPr lang="en-US" dirty="0"/>
           </a:p>
@@ -6265,7 +6288,7 @@
           <a:p>
             <a:fld id="{4EDE50D6-574B-40AF-946F-D52A04ADE379}" type="datetime1">
               <a:rPr lang="en-US" noProof="0" smtClean="0"/>
-              <a:t>2/10/2021</a:t>
+              <a:t>2/11/2021</a:t>
             </a:fld>
             <a:endParaRPr lang="en-US" noProof="0"/>
           </a:p>
@@ -6963,7 +6986,7 @@
           <a:p>
             <a:fld id="{4EDE50D6-574B-40AF-946F-D52A04ADE379}" type="datetime1">
               <a:rPr lang="en-US" noProof="0" smtClean="0"/>
-              <a:t>2/10/2021</a:t>
+              <a:t>2/11/2021</a:t>
             </a:fld>
             <a:endParaRPr lang="en-US" noProof="0"/>
           </a:p>
@@ -7320,7 +7343,7 @@
           <a:p>
             <a:fld id="{4EDE50D6-574B-40AF-946F-D52A04ADE379}" type="datetime1">
               <a:rPr lang="en-US" noProof="0" smtClean="0"/>
-              <a:t>2/10/2021</a:t>
+              <a:t>2/11/2021</a:t>
             </a:fld>
             <a:endParaRPr lang="en-US" noProof="0"/>
           </a:p>
@@ -7785,7 +7808,7 @@
           <a:p>
             <a:fld id="{E46B5B67-55DA-424F-9805-71BDE70D7489}" type="datetimeFigureOut">
               <a:rPr lang="en-US" noProof="0" smtClean="0"/>
-              <a:t>2/10/2021</a:t>
+              <a:t>2/11/2021</a:t>
             </a:fld>
             <a:endParaRPr lang="en-US" noProof="0"/>
           </a:p>
@@ -8812,7 +8835,7 @@
           <a:p>
             <a:fld id="{78DD82B9-B8EE-4375-B6FF-88FA6ABB15D9}" type="datetime1">
               <a:rPr lang="en-US" smtClean="0"/>
-              <a:t>2/10/2021</a:t>
+              <a:t>2/11/2021</a:t>
             </a:fld>
             <a:endParaRPr lang="en-US" dirty="0"/>
           </a:p>
@@ -9160,7 +9183,7 @@
           <a:p>
             <a:fld id="{78DD82B9-B8EE-4375-B6FF-88FA6ABB15D9}" type="datetime1">
               <a:rPr lang="en-US" smtClean="0"/>
-              <a:t>2/10/2021</a:t>
+              <a:t>2/11/2021</a:t>
             </a:fld>
             <a:endParaRPr lang="en-US" dirty="0"/>
           </a:p>
@@ -9563,7 +9586,7 @@
           <a:p>
             <a:fld id="{B2497495-0637-405E-AE64-5CC7506D51F5}" type="datetime1">
               <a:rPr lang="en-US" smtClean="0"/>
-              <a:t>2/10/2021</a:t>
+              <a:t>2/11/2021</a:t>
             </a:fld>
             <a:endParaRPr lang="en-US" dirty="0"/>
           </a:p>
@@ -9856,7 +9879,7 @@
           <a:p>
             <a:fld id="{7BFFD690-9426-415D-8B65-26881E07B2D4}" type="datetime1">
               <a:rPr lang="en-US" smtClean="0"/>
-              <a:t>2/10/2021</a:t>
+              <a:t>2/11/2021</a:t>
             </a:fld>
             <a:endParaRPr lang="en-US" dirty="0"/>
           </a:p>
@@ -10350,7 +10373,7 @@
           <a:p>
             <a:fld id="{04C4989A-474C-40DE-95B9-011C28B71673}" type="datetime1">
               <a:rPr lang="en-US" smtClean="0"/>
-              <a:t>2/10/2021</a:t>
+              <a:t>2/11/2021</a:t>
             </a:fld>
             <a:endParaRPr lang="en-US" dirty="0"/>
           </a:p>
@@ -10654,7 +10677,7 @@
           <a:p>
             <a:fld id="{5DB4ED54-5B5E-4A04-93D3-5772E3CE3818}" type="datetime1">
               <a:rPr lang="en-US" smtClean="0"/>
-              <a:t>2/10/2021</a:t>
+              <a:t>2/11/2021</a:t>
             </a:fld>
             <a:endParaRPr lang="en-US" dirty="0"/>
           </a:p>
@@ -10841,7 +10864,7 @@
           <a:p>
             <a:fld id="{4EDE50D6-574B-40AF-946F-D52A04ADE379}" type="datetime1">
               <a:rPr lang="en-US" smtClean="0"/>
-              <a:t>2/10/2021</a:t>
+              <a:t>2/11/2021</a:t>
             </a:fld>
             <a:endParaRPr lang="en-US" dirty="0"/>
           </a:p>
@@ -11053,7 +11076,7 @@
           <a:p>
             <a:fld id="{4EDE50D6-574B-40AF-946F-D52A04ADE379}" type="datetime1">
               <a:rPr lang="en-US" smtClean="0"/>
-              <a:t>2/10/2021</a:t>
+              <a:t>2/11/2021</a:t>
             </a:fld>
             <a:endParaRPr lang="en-US" dirty="0"/>
           </a:p>
@@ -11485,7 +11508,7 @@
           <a:p>
             <a:fld id="{ED291B17-9318-49DB-B28B-6E5994AE9581}" type="datetime1">
               <a:rPr lang="en-US" smtClean="0"/>
-              <a:t>2/10/2021</a:t>
+              <a:t>2/11/2021</a:t>
             </a:fld>
             <a:endParaRPr lang="en-US" dirty="0"/>
           </a:p>
@@ -12252,13 +12275,19 @@
         </p:nvSpPr>
         <p:spPr/>
         <p:txBody>
-          <a:bodyPr/>
+          <a:bodyPr>
+            <a:normAutofit fontScale="90000"/>
+          </a:bodyPr>
           <a:lstStyle/>
           <a:p>
             <a:r>
               <a:rPr lang="en-US" dirty="0"/>
-              <a:t>CRIME STATS OVER THE PERIOD OF 5 YEARS</a:t>
+              <a:t>CRIME STATS OVER THE PERIOD OF 5 YEARS of zip code 33613</a:t>
             </a:r>
+            <a:br>
+              <a:rPr lang="en-US" dirty="0"/>
+            </a:br>
+            <a:endParaRPr lang="en-US" dirty="0"/>
           </a:p>
         </p:txBody>
       </p:sp>
@@ -12390,12 +12419,14 @@
         </p:nvSpPr>
         <p:spPr/>
         <p:txBody>
-          <a:bodyPr/>
+          <a:bodyPr>
+            <a:normAutofit fontScale="90000"/>
+          </a:bodyPr>
           <a:lstStyle/>
           <a:p>
             <a:r>
               <a:rPr lang="en-US" dirty="0"/>
-              <a:t>CRIME STATS OVER THE PERIOD OF 5 YEARS</a:t>
+              <a:t>CRIME STATS OVER THE PERIOD OF 5 YEARS of zip code 33556</a:t>
             </a:r>
           </a:p>
         </p:txBody>
@@ -12577,17 +12608,21 @@
             <p:ph type="title"/>
           </p:nvPr>
         </p:nvSpPr>
-        <p:spPr/>
-        <p:txBody>
-          <a:bodyPr/>
+        <p:spPr>
+          <a:xfrm>
+            <a:off x="5115340" y="1333500"/>
+            <a:ext cx="4757530" cy="1613201"/>
+          </a:xfrm>
+        </p:spPr>
+        <p:txBody>
+          <a:bodyPr>
+            <a:normAutofit/>
+          </a:bodyPr>
           <a:lstStyle/>
           <a:p>
-            <a:r>
-              <a:rPr lang="en-US" dirty="0">
-                <a:sym typeface="Bodoni SvtyTwo ITC TT-Book"/>
-              </a:rPr>
-              <a:t>QUESTIONS</a:t>
-            </a:r>
+            <a:endParaRPr lang="en-US" dirty="0">
+              <a:sym typeface="Bodoni SvtyTwo ITC TT-Book"/>
+            </a:endParaRPr>
           </a:p>
         </p:txBody>
       </p:sp>
@@ -13947,24 +13982,6 @@
 </file>
 
 <file path=customXml/item1.xml><?xml version="1.0" encoding="utf-8"?>
-<p:properties xmlns:p="http://schemas.microsoft.com/office/2006/metadata/properties" xmlns:xsi="http://www.w3.org/2001/XMLSchema-instance" xmlns:pc="http://schemas.microsoft.com/office/infopath/2007/PartnerControls">
-  <documentManagement>
-    <Status xmlns="71af3243-3dd4-4a8d-8c0d-dd76da1f02a5">Not started</Status>
-    <MediaServiceKeyPoints xmlns="71af3243-3dd4-4a8d-8c0d-dd76da1f02a5" xsi:nil="true"/>
-  </documentManagement>
-</p:properties>
-</file>
-
-<file path=customXml/item2.xml><?xml version="1.0" encoding="utf-8"?>
-<?mso-contentType ?>
-<FormTemplates xmlns="http://schemas.microsoft.com/sharepoint/v3/contenttype/forms">
-  <Display>DocumentLibraryForm</Display>
-  <Edit>DocumentLibraryForm</Edit>
-  <New>DocumentLibraryForm</New>
-</FormTemplates>
-</file>
-
-<file path=customXml/item3.xml><?xml version="1.0" encoding="utf-8"?>
 <ct:contentTypeSchema xmlns:ct="http://schemas.microsoft.com/office/2006/metadata/contentType" xmlns:ma="http://schemas.microsoft.com/office/2006/metadata/properties/metaAttributes" ct:_="" ma:_="" ma:contentTypeName="Document" ma:contentTypeID="0x01010079F111ED35F8CC479449609E8A0923A6" ma:contentTypeVersion="12" ma:contentTypeDescription="Create a new document." ma:contentTypeScope="" ma:versionID="b385d60f68dd989dca1fdc827799d853">
   <xsd:schema xmlns:xsd="http://www.w3.org/2001/XMLSchema" xmlns:xs="http://www.w3.org/2001/XMLSchema" xmlns:p="http://schemas.microsoft.com/office/2006/metadata/properties" xmlns:ns2="71af3243-3dd4-4a8d-8c0d-dd76da1f02a5" xmlns:ns3="16c05727-aa75-4e4a-9b5f-8a80a1165891" targetNamespace="http://schemas.microsoft.com/office/2006/metadata/properties" ma:root="true" ma:fieldsID="1911b479caf7b199da365455750e4572" ns2:_="" ns3:_="">
     <xsd:import namespace="71af3243-3dd4-4a8d-8c0d-dd76da1f02a5"/>
@@ -14185,25 +14202,25 @@
 </ct:contentTypeSchema>
 </file>
 
-<file path=customXml/itemProps1.xml><?xml version="1.0" encoding="utf-8"?>
-<ds:datastoreItem xmlns:ds="http://schemas.openxmlformats.org/officeDocument/2006/customXml" ds:itemID="{ADC43B05-D266-4257-98DE-FF9D8CEDAE76}">
-  <ds:schemaRefs>
-    <ds:schemaRef ds:uri="http://schemas.microsoft.com/office/2006/metadata/properties"/>
-    <ds:schemaRef ds:uri="http://schemas.microsoft.com/office/infopath/2007/PartnerControls"/>
-    <ds:schemaRef ds:uri="71af3243-3dd4-4a8d-8c0d-dd76da1f02a5"/>
-  </ds:schemaRefs>
-</ds:datastoreItem>
+<file path=customXml/item2.xml><?xml version="1.0" encoding="utf-8"?>
+<?mso-contentType ?>
+<FormTemplates xmlns="http://schemas.microsoft.com/sharepoint/v3/contenttype/forms">
+  <Display>DocumentLibraryForm</Display>
+  <Edit>DocumentLibraryForm</Edit>
+  <New>DocumentLibraryForm</New>
+</FormTemplates>
 </file>
 
-<file path=customXml/itemProps2.xml><?xml version="1.0" encoding="utf-8"?>
-<ds:datastoreItem xmlns:ds="http://schemas.openxmlformats.org/officeDocument/2006/customXml" ds:itemID="{8435A0B9-5F49-415F-9BEE-591FDACE98D1}">
-  <ds:schemaRefs>
-    <ds:schemaRef ds:uri="http://schemas.microsoft.com/sharepoint/v3/contenttype/forms"/>
-  </ds:schemaRefs>
-</ds:datastoreItem>
+<file path=customXml/item3.xml><?xml version="1.0" encoding="utf-8"?>
+<p:properties xmlns:p="http://schemas.microsoft.com/office/2006/metadata/properties" xmlns:xsi="http://www.w3.org/2001/XMLSchema-instance" xmlns:pc="http://schemas.microsoft.com/office/infopath/2007/PartnerControls">
+  <documentManagement>
+    <Status xmlns="71af3243-3dd4-4a8d-8c0d-dd76da1f02a5">Not started</Status>
+    <MediaServiceKeyPoints xmlns="71af3243-3dd4-4a8d-8c0d-dd76da1f02a5" xsi:nil="true"/>
+  </documentManagement>
+</p:properties>
 </file>
 
-<file path=customXml/itemProps3.xml><?xml version="1.0" encoding="utf-8"?>
+<file path=customXml/itemProps1.xml><?xml version="1.0" encoding="utf-8"?>
 <ds:datastoreItem xmlns:ds="http://schemas.openxmlformats.org/officeDocument/2006/customXml" ds:itemID="{EB17DF47-B23F-4BE1-BFEA-606A2B278818}">
   <ds:schemaRefs>
     <ds:schemaRef ds:uri="http://schemas.microsoft.com/office/2006/metadata/contentType"/>
@@ -14220,4 +14237,22 @@
     <ds:schemaRef ds:uri="http://schemas.microsoft.com/internal/obd"/>
   </ds:schemaRefs>
 </ds:datastoreItem>
+</file>
+
+<file path=customXml/itemProps2.xml><?xml version="1.0" encoding="utf-8"?>
+<ds:datastoreItem xmlns:ds="http://schemas.openxmlformats.org/officeDocument/2006/customXml" ds:itemID="{8435A0B9-5F49-415F-9BEE-591FDACE98D1}">
+  <ds:schemaRefs>
+    <ds:schemaRef ds:uri="http://schemas.microsoft.com/sharepoint/v3/contenttype/forms"/>
+  </ds:schemaRefs>
+</ds:datastoreItem>
+</file>
+
+<file path=customXml/itemProps3.xml><?xml version="1.0" encoding="utf-8"?>
+<ds:datastoreItem xmlns:ds="http://schemas.openxmlformats.org/officeDocument/2006/customXml" ds:itemID="{ADC43B05-D266-4257-98DE-FF9D8CEDAE76}">
+  <ds:schemaRefs>
+    <ds:schemaRef ds:uri="http://schemas.microsoft.com/office/2006/metadata/properties"/>
+    <ds:schemaRef ds:uri="http://schemas.microsoft.com/office/infopath/2007/PartnerControls"/>
+    <ds:schemaRef ds:uri="71af3243-3dd4-4a8d-8c0d-dd76da1f02a5"/>
+  </ds:schemaRefs>
+</ds:datastoreItem>
 </file>
</xml_diff>

<commit_message>
adding to the presentation file
</commit_message>
<xml_diff>
--- a/SA/Presentation/project_1_schools_presentation (SA).pptx
+++ b/SA/Presentation/project_1_schools_presentation (SA).pptx
@@ -5,19 +5,20 @@
     <p:sldMasterId id="2147483685" r:id="rId4"/>
   </p:sldMasterIdLst>
   <p:notesMasterIdLst>
-    <p:notesMasterId r:id="rId12"/>
+    <p:notesMasterId r:id="rId13"/>
   </p:notesMasterIdLst>
   <p:handoutMasterIdLst>
-    <p:handoutMasterId r:id="rId13"/>
+    <p:handoutMasterId r:id="rId14"/>
   </p:handoutMasterIdLst>
   <p:sldIdLst>
     <p:sldId id="348" r:id="rId5"/>
     <p:sldId id="349" r:id="rId6"/>
     <p:sldId id="352" r:id="rId7"/>
     <p:sldId id="353" r:id="rId8"/>
-    <p:sldId id="285" r:id="rId9"/>
-    <p:sldId id="346" r:id="rId10"/>
-    <p:sldId id="262" r:id="rId11"/>
+    <p:sldId id="354" r:id="rId9"/>
+    <p:sldId id="285" r:id="rId10"/>
+    <p:sldId id="346" r:id="rId11"/>
+    <p:sldId id="262" r:id="rId12"/>
   </p:sldIdLst>
   <p:sldSz cx="12192000" cy="6858000"/>
   <p:notesSz cx="6858000" cy="9144000"/>
@@ -130,7 +131,7 @@
 <file path=ppt/revisionInfo.xml><?xml version="1.0" encoding="utf-8"?>
 <p1510:revInfo xmlns:a="http://schemas.openxmlformats.org/drawingml/2006/main" xmlns:r="http://schemas.openxmlformats.org/officeDocument/2006/relationships" xmlns:p1510="http://schemas.microsoft.com/office/powerpoint/2015/10/main">
   <p1510:revLst>
-    <p1510:client id="{5365E36F-D325-4331-ADF6-8F25ACA6C905}" v="2" dt="2021-02-11T04:41:58.278"/>
+    <p1510:client id="{5365E36F-D325-4331-ADF6-8F25ACA6C905}" v="4" dt="2021-02-11T20:21:57.932"/>
   </p1510:revLst>
 </p1510:revInfo>
 </file>
@@ -140,7 +141,7 @@
   <pc:docChgLst>
     <pc:chgData name="Sam Azhari" userId="4e04bdb60752e412" providerId="LiveId" clId="{5365E36F-D325-4331-ADF6-8F25ACA6C905}"/>
     <pc:docChg chg="undo custSel addSld delSld modSld">
-      <pc:chgData name="Sam Azhari" userId="4e04bdb60752e412" providerId="LiveId" clId="{5365E36F-D325-4331-ADF6-8F25ACA6C905}" dt="2021-02-11T10:29:45.482" v="558" actId="20577"/>
+      <pc:chgData name="Sam Azhari" userId="4e04bdb60752e412" providerId="LiveId" clId="{5365E36F-D325-4331-ADF6-8F25ACA6C905}" dt="2021-02-11T20:22:53.794" v="914" actId="14100"/>
       <pc:docMkLst>
         <pc:docMk/>
       </pc:docMkLst>
@@ -306,6 +307,61 @@
           <ac:picMkLst>
             <pc:docMk/>
             <pc:sldMk cId="2915661404" sldId="353"/>
+            <ac:picMk id="11" creationId="{E1AE3790-DDD1-4F6E-AC45-A3A9EBA4C3B3}"/>
+          </ac:picMkLst>
+        </pc:picChg>
+      </pc:sldChg>
+      <pc:sldChg chg="addSp delSp modSp add mod">
+        <pc:chgData name="Sam Azhari" userId="4e04bdb60752e412" providerId="LiveId" clId="{5365E36F-D325-4331-ADF6-8F25ACA6C905}" dt="2021-02-11T20:22:53.794" v="914" actId="14100"/>
+        <pc:sldMkLst>
+          <pc:docMk/>
+          <pc:sldMk cId="1123053641" sldId="354"/>
+        </pc:sldMkLst>
+        <pc:spChg chg="mod">
+          <ac:chgData name="Sam Azhari" userId="4e04bdb60752e412" providerId="LiveId" clId="{5365E36F-D325-4331-ADF6-8F25ACA6C905}" dt="2021-02-11T20:22:40.499" v="910" actId="1076"/>
+          <ac:spMkLst>
+            <pc:docMk/>
+            <pc:sldMk cId="1123053641" sldId="354"/>
+            <ac:spMk id="2" creationId="{6AF4CE45-17EF-4DD8-8FCE-1D53FACC8B12}"/>
+          </ac:spMkLst>
+        </pc:spChg>
+        <pc:spChg chg="mod">
+          <ac:chgData name="Sam Azhari" userId="4e04bdb60752e412" providerId="LiveId" clId="{5365E36F-D325-4331-ADF6-8F25ACA6C905}" dt="2021-02-11T20:18:53.896" v="643" actId="26606"/>
+          <ac:spMkLst>
+            <pc:docMk/>
+            <pc:sldMk cId="1123053641" sldId="354"/>
+            <ac:spMk id="4" creationId="{80C04FA2-C6F3-4098-B9F9-B6EDB57A0455}"/>
+          </ac:spMkLst>
+        </pc:spChg>
+        <pc:spChg chg="add del mod">
+          <ac:chgData name="Sam Azhari" userId="4e04bdb60752e412" providerId="LiveId" clId="{5365E36F-D325-4331-ADF6-8F25ACA6C905}" dt="2021-02-11T20:18:41.759" v="640" actId="931"/>
+          <ac:spMkLst>
+            <pc:docMk/>
+            <pc:sldMk cId="1123053641" sldId="354"/>
+            <ac:spMk id="5" creationId="{E58B0415-4C31-4A37-9746-D73692B05E59}"/>
+          </ac:spMkLst>
+        </pc:spChg>
+        <pc:picChg chg="add mod ord">
+          <ac:chgData name="Sam Azhari" userId="4e04bdb60752e412" providerId="LiveId" clId="{5365E36F-D325-4331-ADF6-8F25ACA6C905}" dt="2021-02-11T20:22:53.794" v="914" actId="14100"/>
+          <ac:picMkLst>
+            <pc:docMk/>
+            <pc:sldMk cId="1123053641" sldId="354"/>
+            <ac:picMk id="7" creationId="{2DF53E8D-678F-4621-9B8D-2298BCB9A372}"/>
+          </ac:picMkLst>
+        </pc:picChg>
+        <pc:picChg chg="add mod">
+          <ac:chgData name="Sam Azhari" userId="4e04bdb60752e412" providerId="LiveId" clId="{5365E36F-D325-4331-ADF6-8F25ACA6C905}" dt="2021-02-11T20:22:48.933" v="912" actId="14100"/>
+          <ac:picMkLst>
+            <pc:docMk/>
+            <pc:sldMk cId="1123053641" sldId="354"/>
+            <ac:picMk id="9" creationId="{30255747-7A2F-4937-B27D-3E57763983AD}"/>
+          </ac:picMkLst>
+        </pc:picChg>
+        <pc:picChg chg="del">
+          <ac:chgData name="Sam Azhari" userId="4e04bdb60752e412" providerId="LiveId" clId="{5365E36F-D325-4331-ADF6-8F25ACA6C905}" dt="2021-02-11T20:18:22.723" v="639" actId="478"/>
+          <ac:picMkLst>
+            <pc:docMk/>
+            <pc:sldMk cId="1123053641" sldId="354"/>
             <ac:picMk id="11" creationId="{E1AE3790-DDD1-4F6E-AC45-A3A9EBA4C3B3}"/>
           </ac:picMkLst>
         </pc:picChg>
@@ -12492,6 +12548,180 @@
       </p:grpSpPr>
       <p:pic>
         <p:nvPicPr>
+          <p:cNvPr id="7" name="Content Placeholder 6" descr="Logo&#10;&#10;Description automatically generated">
+            <a:extLst>
+              <a:ext uri="{FF2B5EF4-FFF2-40B4-BE49-F238E27FC236}">
+                <a16:creationId xmlns:a16="http://schemas.microsoft.com/office/drawing/2014/main" id="{2DF53E8D-678F-4621-9B8D-2298BCB9A372}"/>
+              </a:ext>
+            </a:extLst>
+          </p:cNvPr>
+          <p:cNvPicPr>
+            <a:picLocks noGrp="1" noChangeAspect="1"/>
+          </p:cNvPicPr>
+          <p:nvPr>
+            <p:ph sz="half" idx="1"/>
+          </p:nvPr>
+        </p:nvPicPr>
+        <p:blipFill>
+          <a:blip r:embed="rId2"/>
+          <a:stretch>
+            <a:fillRect/>
+          </a:stretch>
+        </p:blipFill>
+        <p:spPr>
+          <a:xfrm>
+            <a:off x="6657975" y="3069151"/>
+            <a:ext cx="4603773" cy="4043618"/>
+          </a:xfrm>
+          <a:noFill/>
+        </p:spPr>
+      </p:pic>
+      <p:sp>
+        <p:nvSpPr>
+          <p:cNvPr id="2" name="Content Placeholder 1">
+            <a:extLst>
+              <a:ext uri="{FF2B5EF4-FFF2-40B4-BE49-F238E27FC236}">
+                <a16:creationId xmlns:a16="http://schemas.microsoft.com/office/drawing/2014/main" id="{6AF4CE45-17EF-4DD8-8FCE-1D53FACC8B12}"/>
+              </a:ext>
+            </a:extLst>
+          </p:cNvPr>
+          <p:cNvSpPr>
+            <a:spLocks noGrp="1"/>
+          </p:cNvSpPr>
+          <p:nvPr>
+            <p:ph sz="half" idx="2"/>
+          </p:nvPr>
+        </p:nvSpPr>
+        <p:spPr>
+          <a:xfrm>
+            <a:off x="2836224" y="1311064"/>
+            <a:ext cx="6917210" cy="4467523"/>
+          </a:xfrm>
+        </p:spPr>
+        <p:txBody>
+          <a:bodyPr anchor="t">
+            <a:normAutofit/>
+          </a:bodyPr>
+          <a:lstStyle/>
+          <a:p>
+            <a:endParaRPr lang="en-US" dirty="0"/>
+          </a:p>
+          <a:p>
+            <a:r>
+              <a:rPr lang="en-US" dirty="0"/>
+              <a:t>This graph is A Comparison of the count of crimes committed in each of the zip codes in target,</a:t>
+            </a:r>
+          </a:p>
+          <a:p>
+            <a:r>
+              <a:rPr lang="en-US" dirty="0"/>
+              <a:t>A clear difference in the count of crimes between each of these two Zip Codes</a:t>
+            </a:r>
+          </a:p>
+        </p:txBody>
+      </p:sp>
+      <p:sp>
+        <p:nvSpPr>
+          <p:cNvPr id="4" name="Title 3">
+            <a:extLst>
+              <a:ext uri="{FF2B5EF4-FFF2-40B4-BE49-F238E27FC236}">
+                <a16:creationId xmlns:a16="http://schemas.microsoft.com/office/drawing/2014/main" id="{80C04FA2-C6F3-4098-B9F9-B6EDB57A0455}"/>
+              </a:ext>
+            </a:extLst>
+          </p:cNvPr>
+          <p:cNvSpPr>
+            <a:spLocks noGrp="1"/>
+          </p:cNvSpPr>
+          <p:nvPr>
+            <p:ph type="title"/>
+          </p:nvPr>
+        </p:nvSpPr>
+        <p:spPr>
+          <a:xfrm>
+            <a:off x="581192" y="702156"/>
+            <a:ext cx="11029616" cy="740156"/>
+          </a:xfrm>
+        </p:spPr>
+        <p:txBody>
+          <a:bodyPr anchor="t">
+            <a:normAutofit/>
+          </a:bodyPr>
+          <a:lstStyle/>
+          <a:p>
+            <a:pPr>
+              <a:lnSpc>
+                <a:spcPct val="90000"/>
+              </a:lnSpc>
+            </a:pPr>
+            <a:r>
+              <a:rPr lang="en-US" sz="2100" dirty="0"/>
+              <a:t>COMPARISON OF CRIMES COUNT BETWEEN BOTH ZIP CODES (33613 &amp; 33556)</a:t>
+            </a:r>
+          </a:p>
+        </p:txBody>
+      </p:sp>
+      <p:pic>
+        <p:nvPicPr>
+          <p:cNvPr id="9" name="Picture 8" descr="Chart&#10;&#10;Description automatically generated">
+            <a:extLst>
+              <a:ext uri="{FF2B5EF4-FFF2-40B4-BE49-F238E27FC236}">
+                <a16:creationId xmlns:a16="http://schemas.microsoft.com/office/drawing/2014/main" id="{30255747-7A2F-4937-B27D-3E57763983AD}"/>
+              </a:ext>
+            </a:extLst>
+          </p:cNvPr>
+          <p:cNvPicPr>
+            <a:picLocks noChangeAspect="1"/>
+          </p:cNvPicPr>
+          <p:nvPr/>
+        </p:nvPicPr>
+        <p:blipFill>
+          <a:blip r:embed="rId3"/>
+          <a:stretch>
+            <a:fillRect/>
+          </a:stretch>
+        </p:blipFill>
+        <p:spPr>
+          <a:xfrm>
+            <a:off x="111899" y="3291557"/>
+            <a:ext cx="5031601" cy="3397627"/>
+          </a:xfrm>
+          <a:prstGeom prst="rect">
+            <a:avLst/>
+          </a:prstGeom>
+        </p:spPr>
+      </p:pic>
+    </p:spTree>
+    <p:extLst>
+      <p:ext uri="{BB962C8B-B14F-4D97-AF65-F5344CB8AC3E}">
+        <p14:creationId xmlns:p14="http://schemas.microsoft.com/office/powerpoint/2010/main" val="1123053641"/>
+      </p:ext>
+    </p:extLst>
+  </p:cSld>
+  <p:clrMapOvr>
+    <a:masterClrMapping/>
+  </p:clrMapOvr>
+</p:sld>
+</file>
+
+<file path=ppt/slides/slide6.xml><?xml version="1.0" encoding="utf-8"?>
+<p:sld xmlns:a="http://schemas.openxmlformats.org/drawingml/2006/main" xmlns:r="http://schemas.openxmlformats.org/officeDocument/2006/relationships" xmlns:p="http://schemas.openxmlformats.org/presentationml/2006/main">
+  <p:cSld>
+    <p:spTree>
+      <p:nvGrpSpPr>
+        <p:cNvPr id="1" name=""/>
+        <p:cNvGrpSpPr/>
+        <p:nvPr/>
+      </p:nvGrpSpPr>
+      <p:grpSpPr>
+        <a:xfrm>
+          <a:off x="0" y="0"/>
+          <a:ext cx="0" cy="0"/>
+          <a:chOff x="0" y="0"/>
+          <a:chExt cx="0" cy="0"/>
+        </a:xfrm>
+      </p:grpSpPr>
+      <p:pic>
+        <p:nvPicPr>
           <p:cNvPr id="33" name="Picture Placeholder 32" descr="A view of a city and buildings ">
             <a:extLst>
               <a:ext uri="{FF2B5EF4-FFF2-40B4-BE49-F238E27FC236}">
@@ -12639,7 +12869,7 @@
 </p:sld>
 </file>
 
-<file path=ppt/slides/slide6.xml><?xml version="1.0" encoding="utf-8"?>
+<file path=ppt/slides/slide7.xml><?xml version="1.0" encoding="utf-8"?>
 <p:sld xmlns:a="http://schemas.openxmlformats.org/drawingml/2006/main" xmlns:r="http://schemas.openxmlformats.org/officeDocument/2006/relationships" xmlns:p="http://schemas.openxmlformats.org/presentationml/2006/main">
   <p:cSld>
     <p:spTree>
@@ -12762,7 +12992,7 @@
 </p:sld>
 </file>
 
-<file path=ppt/slides/slide7.xml><?xml version="1.0" encoding="utf-8"?>
+<file path=ppt/slides/slide8.xml><?xml version="1.0" encoding="utf-8"?>
 <p:sld xmlns:a="http://schemas.openxmlformats.org/drawingml/2006/main" xmlns:r="http://schemas.openxmlformats.org/officeDocument/2006/relationships" xmlns:p="http://schemas.openxmlformats.org/presentationml/2006/main">
   <p:cSld>
     <p:spTree>
@@ -13982,6 +14212,24 @@
 </file>
 
 <file path=customXml/item1.xml><?xml version="1.0" encoding="utf-8"?>
+<p:properties xmlns:p="http://schemas.microsoft.com/office/2006/metadata/properties" xmlns:xsi="http://www.w3.org/2001/XMLSchema-instance" xmlns:pc="http://schemas.microsoft.com/office/infopath/2007/PartnerControls">
+  <documentManagement>
+    <Status xmlns="71af3243-3dd4-4a8d-8c0d-dd76da1f02a5">Not started</Status>
+    <MediaServiceKeyPoints xmlns="71af3243-3dd4-4a8d-8c0d-dd76da1f02a5" xsi:nil="true"/>
+  </documentManagement>
+</p:properties>
+</file>
+
+<file path=customXml/item2.xml><?xml version="1.0" encoding="utf-8"?>
+<?mso-contentType ?>
+<FormTemplates xmlns="http://schemas.microsoft.com/sharepoint/v3/contenttype/forms">
+  <Display>DocumentLibraryForm</Display>
+  <Edit>DocumentLibraryForm</Edit>
+  <New>DocumentLibraryForm</New>
+</FormTemplates>
+</file>
+
+<file path=customXml/item3.xml><?xml version="1.0" encoding="utf-8"?>
 <ct:contentTypeSchema xmlns:ct="http://schemas.microsoft.com/office/2006/metadata/contentType" xmlns:ma="http://schemas.microsoft.com/office/2006/metadata/properties/metaAttributes" ct:_="" ma:_="" ma:contentTypeName="Document" ma:contentTypeID="0x01010079F111ED35F8CC479449609E8A0923A6" ma:contentTypeVersion="12" ma:contentTypeDescription="Create a new document." ma:contentTypeScope="" ma:versionID="b385d60f68dd989dca1fdc827799d853">
   <xsd:schema xmlns:xsd="http://www.w3.org/2001/XMLSchema" xmlns:xs="http://www.w3.org/2001/XMLSchema" xmlns:p="http://schemas.microsoft.com/office/2006/metadata/properties" xmlns:ns2="71af3243-3dd4-4a8d-8c0d-dd76da1f02a5" xmlns:ns3="16c05727-aa75-4e4a-9b5f-8a80a1165891" targetNamespace="http://schemas.microsoft.com/office/2006/metadata/properties" ma:root="true" ma:fieldsID="1911b479caf7b199da365455750e4572" ns2:_="" ns3:_="">
     <xsd:import namespace="71af3243-3dd4-4a8d-8c0d-dd76da1f02a5"/>
@@ -14202,25 +14450,25 @@
 </ct:contentTypeSchema>
 </file>
 
-<file path=customXml/item2.xml><?xml version="1.0" encoding="utf-8"?>
-<?mso-contentType ?>
-<FormTemplates xmlns="http://schemas.microsoft.com/sharepoint/v3/contenttype/forms">
-  <Display>DocumentLibraryForm</Display>
-  <Edit>DocumentLibraryForm</Edit>
-  <New>DocumentLibraryForm</New>
-</FormTemplates>
+<file path=customXml/itemProps1.xml><?xml version="1.0" encoding="utf-8"?>
+<ds:datastoreItem xmlns:ds="http://schemas.openxmlformats.org/officeDocument/2006/customXml" ds:itemID="{ADC43B05-D266-4257-98DE-FF9D8CEDAE76}">
+  <ds:schemaRefs>
+    <ds:schemaRef ds:uri="http://schemas.microsoft.com/office/2006/metadata/properties"/>
+    <ds:schemaRef ds:uri="http://schemas.microsoft.com/office/infopath/2007/PartnerControls"/>
+    <ds:schemaRef ds:uri="71af3243-3dd4-4a8d-8c0d-dd76da1f02a5"/>
+  </ds:schemaRefs>
+</ds:datastoreItem>
 </file>
 
-<file path=customXml/item3.xml><?xml version="1.0" encoding="utf-8"?>
-<p:properties xmlns:p="http://schemas.microsoft.com/office/2006/metadata/properties" xmlns:xsi="http://www.w3.org/2001/XMLSchema-instance" xmlns:pc="http://schemas.microsoft.com/office/infopath/2007/PartnerControls">
-  <documentManagement>
-    <Status xmlns="71af3243-3dd4-4a8d-8c0d-dd76da1f02a5">Not started</Status>
-    <MediaServiceKeyPoints xmlns="71af3243-3dd4-4a8d-8c0d-dd76da1f02a5" xsi:nil="true"/>
-  </documentManagement>
-</p:properties>
+<file path=customXml/itemProps2.xml><?xml version="1.0" encoding="utf-8"?>
+<ds:datastoreItem xmlns:ds="http://schemas.openxmlformats.org/officeDocument/2006/customXml" ds:itemID="{8435A0B9-5F49-415F-9BEE-591FDACE98D1}">
+  <ds:schemaRefs>
+    <ds:schemaRef ds:uri="http://schemas.microsoft.com/sharepoint/v3/contenttype/forms"/>
+  </ds:schemaRefs>
+</ds:datastoreItem>
 </file>
 
-<file path=customXml/itemProps1.xml><?xml version="1.0" encoding="utf-8"?>
+<file path=customXml/itemProps3.xml><?xml version="1.0" encoding="utf-8"?>
 <ds:datastoreItem xmlns:ds="http://schemas.openxmlformats.org/officeDocument/2006/customXml" ds:itemID="{EB17DF47-B23F-4BE1-BFEA-606A2B278818}">
   <ds:schemaRefs>
     <ds:schemaRef ds:uri="http://schemas.microsoft.com/office/2006/metadata/contentType"/>
@@ -14237,22 +14485,4 @@
     <ds:schemaRef ds:uri="http://schemas.microsoft.com/internal/obd"/>
   </ds:schemaRefs>
 </ds:datastoreItem>
-</file>
-
-<file path=customXml/itemProps2.xml><?xml version="1.0" encoding="utf-8"?>
-<ds:datastoreItem xmlns:ds="http://schemas.openxmlformats.org/officeDocument/2006/customXml" ds:itemID="{8435A0B9-5F49-415F-9BEE-591FDACE98D1}">
-  <ds:schemaRefs>
-    <ds:schemaRef ds:uri="http://schemas.microsoft.com/sharepoint/v3/contenttype/forms"/>
-  </ds:schemaRefs>
-</ds:datastoreItem>
-</file>
-
-<file path=customXml/itemProps3.xml><?xml version="1.0" encoding="utf-8"?>
-<ds:datastoreItem xmlns:ds="http://schemas.openxmlformats.org/officeDocument/2006/customXml" ds:itemID="{ADC43B05-D266-4257-98DE-FF9D8CEDAE76}">
-  <ds:schemaRefs>
-    <ds:schemaRef ds:uri="http://schemas.microsoft.com/office/2006/metadata/properties"/>
-    <ds:schemaRef ds:uri="http://schemas.microsoft.com/office/infopath/2007/PartnerControls"/>
-    <ds:schemaRef ds:uri="71af3243-3dd4-4a8d-8c0d-dd76da1f02a5"/>
-  </ds:schemaRefs>
-</ds:datastoreItem>
 </file>
</xml_diff>